<commit_message>
added more information about cortisol
</commit_message>
<xml_diff>
--- a/PHYS101/adrenals-and-stress-hormones/adrenals-growth-lecture-full.pptx
+++ b/PHYS101/adrenals-and-stress-hormones/adrenals-growth-lecture-full.pptx
@@ -4,6 +4,9 @@
   <p:sldMasterIdLst>
     <p:sldMasterId id="2147483648" r:id="rId1"/>
   </p:sldMasterIdLst>
+  <p:notesMasterIdLst>
+    <p:notesMasterId r:id="rId27"/>
+  </p:notesMasterIdLst>
   <p:sldIdLst>
     <p:sldId id="256" r:id="rId2"/>
     <p:sldId id="261" r:id="rId3"/>
@@ -20,10 +23,16 @@
     <p:sldId id="263" r:id="rId14"/>
     <p:sldId id="271" r:id="rId15"/>
     <p:sldId id="272" r:id="rId16"/>
-    <p:sldId id="275" r:id="rId17"/>
-    <p:sldId id="274" r:id="rId18"/>
-    <p:sldId id="269" r:id="rId19"/>
-    <p:sldId id="264" r:id="rId20"/>
+    <p:sldId id="276" r:id="rId17"/>
+    <p:sldId id="275" r:id="rId18"/>
+    <p:sldId id="274" r:id="rId19"/>
+    <p:sldId id="269" r:id="rId20"/>
+    <p:sldId id="281" r:id="rId21"/>
+    <p:sldId id="277" r:id="rId22"/>
+    <p:sldId id="278" r:id="rId23"/>
+    <p:sldId id="280" r:id="rId24"/>
+    <p:sldId id="279" r:id="rId25"/>
+    <p:sldId id="264" r:id="rId26"/>
   </p:sldIdLst>
   <p:sldSz cx="9144000" cy="6858000" type="screen4x3"/>
   <p:notesSz cx="6858000" cy="9144000"/>
@@ -122,7 +131,689 @@
       </a:defRPr>
     </a:lvl9pPr>
   </p:defaultTextStyle>
+  <p:extLst>
+    <p:ext uri="{521415D9-36F7-43E2-AB2F-B90AF26B5E84}">
+      <p14:sectionLst xmlns:p14="http://schemas.microsoft.com/office/powerpoint/2010/main">
+        <p14:section name="Default Section" id="{F7F47972-CB1C-6340-9BAC-08E7CD4535EA}">
+          <p14:sldIdLst>
+            <p14:sldId id="256"/>
+            <p14:sldId id="261"/>
+            <p14:sldId id="257"/>
+            <p14:sldId id="258"/>
+            <p14:sldId id="259"/>
+            <p14:sldId id="260"/>
+            <p14:sldId id="266"/>
+            <p14:sldId id="262"/>
+            <p14:sldId id="265"/>
+            <p14:sldId id="267"/>
+            <p14:sldId id="268"/>
+            <p14:sldId id="270"/>
+            <p14:sldId id="263"/>
+            <p14:sldId id="271"/>
+            <p14:sldId id="272"/>
+            <p14:sldId id="276"/>
+            <p14:sldId id="275"/>
+            <p14:sldId id="274"/>
+            <p14:sldId id="269"/>
+            <p14:sldId id="281"/>
+            <p14:sldId id="277"/>
+            <p14:sldId id="278"/>
+            <p14:sldId id="280"/>
+            <p14:sldId id="279"/>
+            <p14:sldId id="264"/>
+          </p14:sldIdLst>
+        </p14:section>
+      </p14:sectionLst>
+    </p:ext>
+  </p:extLst>
 </p:presentation>
+</file>
+
+<file path=ppt/notesMasters/notesMaster1.xml><?xml version="1.0" encoding="utf-8"?>
+<p:notesMaster xmlns:a="http://schemas.openxmlformats.org/drawingml/2006/main" xmlns:r="http://schemas.openxmlformats.org/officeDocument/2006/relationships" xmlns:p="http://schemas.openxmlformats.org/presentationml/2006/main">
+  <p:cSld>
+    <p:bg>
+      <p:bgRef idx="1001">
+        <a:schemeClr val="bg1"/>
+      </p:bgRef>
+    </p:bg>
+    <p:spTree>
+      <p:nvGrpSpPr>
+        <p:cNvPr id="1" name=""/>
+        <p:cNvGrpSpPr/>
+        <p:nvPr/>
+      </p:nvGrpSpPr>
+      <p:grpSpPr>
+        <a:xfrm>
+          <a:off x="0" y="0"/>
+          <a:ext cx="0" cy="0"/>
+          <a:chOff x="0" y="0"/>
+          <a:chExt cx="0" cy="0"/>
+        </a:xfrm>
+      </p:grpSpPr>
+      <p:sp>
+        <p:nvSpPr>
+          <p:cNvPr id="2" name="Header Placeholder 1"/>
+          <p:cNvSpPr>
+            <a:spLocks noGrp="1"/>
+          </p:cNvSpPr>
+          <p:nvPr>
+            <p:ph type="hdr" sz="quarter"/>
+          </p:nvPr>
+        </p:nvSpPr>
+        <p:spPr>
+          <a:xfrm>
+            <a:off x="0" y="0"/>
+            <a:ext cx="2971800" cy="457200"/>
+          </a:xfrm>
+          <a:prstGeom prst="rect">
+            <a:avLst/>
+          </a:prstGeom>
+        </p:spPr>
+        <p:txBody>
+          <a:bodyPr vert="horz" lIns="91440" tIns="45720" rIns="91440" bIns="45720" rtlCol="0"/>
+          <a:lstStyle>
+            <a:lvl1pPr algn="l">
+              <a:defRPr sz="1200"/>
+            </a:lvl1pPr>
+          </a:lstStyle>
+          <a:p>
+            <a:endParaRPr lang="en-US"/>
+          </a:p>
+        </p:txBody>
+      </p:sp>
+      <p:sp>
+        <p:nvSpPr>
+          <p:cNvPr id="3" name="Date Placeholder 2"/>
+          <p:cNvSpPr>
+            <a:spLocks noGrp="1"/>
+          </p:cNvSpPr>
+          <p:nvPr>
+            <p:ph type="dt" idx="1"/>
+          </p:nvPr>
+        </p:nvSpPr>
+        <p:spPr>
+          <a:xfrm>
+            <a:off x="3884613" y="0"/>
+            <a:ext cx="2971800" cy="457200"/>
+          </a:xfrm>
+          <a:prstGeom prst="rect">
+            <a:avLst/>
+          </a:prstGeom>
+        </p:spPr>
+        <p:txBody>
+          <a:bodyPr vert="horz" lIns="91440" tIns="45720" rIns="91440" bIns="45720" rtlCol="0"/>
+          <a:lstStyle>
+            <a:lvl1pPr algn="r">
+              <a:defRPr sz="1200"/>
+            </a:lvl1pPr>
+          </a:lstStyle>
+          <a:p>
+            <a:fld id="{6A332379-D926-E241-B4BE-482DBD0EAB43}" type="datetimeFigureOut">
+              <a:rPr lang="en-US" smtClean="0"/>
+              <a:t>3/18/15</a:t>
+            </a:fld>
+            <a:endParaRPr lang="en-US"/>
+          </a:p>
+        </p:txBody>
+      </p:sp>
+      <p:sp>
+        <p:nvSpPr>
+          <p:cNvPr id="4" name="Slide Image Placeholder 3"/>
+          <p:cNvSpPr>
+            <a:spLocks noGrp="1" noRot="1" noChangeAspect="1"/>
+          </p:cNvSpPr>
+          <p:nvPr>
+            <p:ph type="sldImg" idx="2"/>
+          </p:nvPr>
+        </p:nvSpPr>
+        <p:spPr>
+          <a:xfrm>
+            <a:off x="1143000" y="685800"/>
+            <a:ext cx="4572000" cy="3429000"/>
+          </a:xfrm>
+          <a:prstGeom prst="rect">
+            <a:avLst/>
+          </a:prstGeom>
+          <a:noFill/>
+          <a:ln w="12700">
+            <a:solidFill>
+              <a:prstClr val="black"/>
+            </a:solidFill>
+          </a:ln>
+        </p:spPr>
+        <p:txBody>
+          <a:bodyPr vert="horz" lIns="91440" tIns="45720" rIns="91440" bIns="45720" rtlCol="0" anchor="ctr"/>
+          <a:lstStyle/>
+          <a:p>
+            <a:endParaRPr lang="en-US"/>
+          </a:p>
+        </p:txBody>
+      </p:sp>
+      <p:sp>
+        <p:nvSpPr>
+          <p:cNvPr id="5" name="Notes Placeholder 4"/>
+          <p:cNvSpPr>
+            <a:spLocks noGrp="1"/>
+          </p:cNvSpPr>
+          <p:nvPr>
+            <p:ph type="body" sz="quarter" idx="3"/>
+          </p:nvPr>
+        </p:nvSpPr>
+        <p:spPr>
+          <a:xfrm>
+            <a:off x="685800" y="4343400"/>
+            <a:ext cx="5486400" cy="4114800"/>
+          </a:xfrm>
+          <a:prstGeom prst="rect">
+            <a:avLst/>
+          </a:prstGeom>
+        </p:spPr>
+        <p:txBody>
+          <a:bodyPr vert="horz" lIns="91440" tIns="45720" rIns="91440" bIns="45720" rtlCol="0"/>
+          <a:lstStyle/>
+          <a:p>
+            <a:pPr lvl="0"/>
+            <a:r>
+              <a:rPr lang="en-US" smtClean="0"/>
+              <a:t>Click to edit Master text styles</a:t>
+            </a:r>
+          </a:p>
+          <a:p>
+            <a:pPr lvl="1"/>
+            <a:r>
+              <a:rPr lang="en-US" smtClean="0"/>
+              <a:t>Second level</a:t>
+            </a:r>
+          </a:p>
+          <a:p>
+            <a:pPr lvl="2"/>
+            <a:r>
+              <a:rPr lang="en-US" smtClean="0"/>
+              <a:t>Third level</a:t>
+            </a:r>
+          </a:p>
+          <a:p>
+            <a:pPr lvl="3"/>
+            <a:r>
+              <a:rPr lang="en-US" smtClean="0"/>
+              <a:t>Fourth level</a:t>
+            </a:r>
+          </a:p>
+          <a:p>
+            <a:pPr lvl="4"/>
+            <a:r>
+              <a:rPr lang="en-US" smtClean="0"/>
+              <a:t>Fifth level</a:t>
+            </a:r>
+            <a:endParaRPr lang="en-US"/>
+          </a:p>
+        </p:txBody>
+      </p:sp>
+      <p:sp>
+        <p:nvSpPr>
+          <p:cNvPr id="6" name="Footer Placeholder 5"/>
+          <p:cNvSpPr>
+            <a:spLocks noGrp="1"/>
+          </p:cNvSpPr>
+          <p:nvPr>
+            <p:ph type="ftr" sz="quarter" idx="4"/>
+          </p:nvPr>
+        </p:nvSpPr>
+        <p:spPr>
+          <a:xfrm>
+            <a:off x="0" y="8685213"/>
+            <a:ext cx="2971800" cy="457200"/>
+          </a:xfrm>
+          <a:prstGeom prst="rect">
+            <a:avLst/>
+          </a:prstGeom>
+        </p:spPr>
+        <p:txBody>
+          <a:bodyPr vert="horz" lIns="91440" tIns="45720" rIns="91440" bIns="45720" rtlCol="0" anchor="b"/>
+          <a:lstStyle>
+            <a:lvl1pPr algn="l">
+              <a:defRPr sz="1200"/>
+            </a:lvl1pPr>
+          </a:lstStyle>
+          <a:p>
+            <a:endParaRPr lang="en-US"/>
+          </a:p>
+        </p:txBody>
+      </p:sp>
+      <p:sp>
+        <p:nvSpPr>
+          <p:cNvPr id="7" name="Slide Number Placeholder 6"/>
+          <p:cNvSpPr>
+            <a:spLocks noGrp="1"/>
+          </p:cNvSpPr>
+          <p:nvPr>
+            <p:ph type="sldNum" sz="quarter" idx="5"/>
+          </p:nvPr>
+        </p:nvSpPr>
+        <p:spPr>
+          <a:xfrm>
+            <a:off x="3884613" y="8685213"/>
+            <a:ext cx="2971800" cy="457200"/>
+          </a:xfrm>
+          <a:prstGeom prst="rect">
+            <a:avLst/>
+          </a:prstGeom>
+        </p:spPr>
+        <p:txBody>
+          <a:bodyPr vert="horz" lIns="91440" tIns="45720" rIns="91440" bIns="45720" rtlCol="0" anchor="b"/>
+          <a:lstStyle>
+            <a:lvl1pPr algn="r">
+              <a:defRPr sz="1200"/>
+            </a:lvl1pPr>
+          </a:lstStyle>
+          <a:p>
+            <a:fld id="{569ACDED-B45A-E249-B67B-638F9856466D}" type="slidenum">
+              <a:rPr lang="en-US" smtClean="0"/>
+              <a:t>‹#›</a:t>
+            </a:fld>
+            <a:endParaRPr lang="en-US"/>
+          </a:p>
+        </p:txBody>
+      </p:sp>
+    </p:spTree>
+    <p:extLst>
+      <p:ext uri="{BB962C8B-B14F-4D97-AF65-F5344CB8AC3E}">
+        <p14:creationId xmlns:p14="http://schemas.microsoft.com/office/powerpoint/2010/main" val="2715927857"/>
+      </p:ext>
+    </p:extLst>
+  </p:cSld>
+  <p:clrMap bg1="lt1" tx1="dk1" bg2="lt2" tx2="dk2" accent1="accent1" accent2="accent2" accent3="accent3" accent4="accent4" accent5="accent5" accent6="accent6" hlink="hlink" folHlink="folHlink"/>
+  <p:notesStyle>
+    <a:lvl1pPr marL="0" algn="l" defTabSz="457200" rtl="0" eaLnBrk="1" latinLnBrk="0" hangingPunct="1">
+      <a:defRPr sz="1200" kern="1200">
+        <a:solidFill>
+          <a:schemeClr val="tx1"/>
+        </a:solidFill>
+        <a:latin typeface="+mn-lt"/>
+        <a:ea typeface="+mn-ea"/>
+        <a:cs typeface="+mn-cs"/>
+      </a:defRPr>
+    </a:lvl1pPr>
+    <a:lvl2pPr marL="457200" algn="l" defTabSz="457200" rtl="0" eaLnBrk="1" latinLnBrk="0" hangingPunct="1">
+      <a:defRPr sz="1200" kern="1200">
+        <a:solidFill>
+          <a:schemeClr val="tx1"/>
+        </a:solidFill>
+        <a:latin typeface="+mn-lt"/>
+        <a:ea typeface="+mn-ea"/>
+        <a:cs typeface="+mn-cs"/>
+      </a:defRPr>
+    </a:lvl2pPr>
+    <a:lvl3pPr marL="914400" algn="l" defTabSz="457200" rtl="0" eaLnBrk="1" latinLnBrk="0" hangingPunct="1">
+      <a:defRPr sz="1200" kern="1200">
+        <a:solidFill>
+          <a:schemeClr val="tx1"/>
+        </a:solidFill>
+        <a:latin typeface="+mn-lt"/>
+        <a:ea typeface="+mn-ea"/>
+        <a:cs typeface="+mn-cs"/>
+      </a:defRPr>
+    </a:lvl3pPr>
+    <a:lvl4pPr marL="1371600" algn="l" defTabSz="457200" rtl="0" eaLnBrk="1" latinLnBrk="0" hangingPunct="1">
+      <a:defRPr sz="1200" kern="1200">
+        <a:solidFill>
+          <a:schemeClr val="tx1"/>
+        </a:solidFill>
+        <a:latin typeface="+mn-lt"/>
+        <a:ea typeface="+mn-ea"/>
+        <a:cs typeface="+mn-cs"/>
+      </a:defRPr>
+    </a:lvl4pPr>
+    <a:lvl5pPr marL="1828800" algn="l" defTabSz="457200" rtl="0" eaLnBrk="1" latinLnBrk="0" hangingPunct="1">
+      <a:defRPr sz="1200" kern="1200">
+        <a:solidFill>
+          <a:schemeClr val="tx1"/>
+        </a:solidFill>
+        <a:latin typeface="+mn-lt"/>
+        <a:ea typeface="+mn-ea"/>
+        <a:cs typeface="+mn-cs"/>
+      </a:defRPr>
+    </a:lvl5pPr>
+    <a:lvl6pPr marL="2286000" algn="l" defTabSz="457200" rtl="0" eaLnBrk="1" latinLnBrk="0" hangingPunct="1">
+      <a:defRPr sz="1200" kern="1200">
+        <a:solidFill>
+          <a:schemeClr val="tx1"/>
+        </a:solidFill>
+        <a:latin typeface="+mn-lt"/>
+        <a:ea typeface="+mn-ea"/>
+        <a:cs typeface="+mn-cs"/>
+      </a:defRPr>
+    </a:lvl6pPr>
+    <a:lvl7pPr marL="2743200" algn="l" defTabSz="457200" rtl="0" eaLnBrk="1" latinLnBrk="0" hangingPunct="1">
+      <a:defRPr sz="1200" kern="1200">
+        <a:solidFill>
+          <a:schemeClr val="tx1"/>
+        </a:solidFill>
+        <a:latin typeface="+mn-lt"/>
+        <a:ea typeface="+mn-ea"/>
+        <a:cs typeface="+mn-cs"/>
+      </a:defRPr>
+    </a:lvl7pPr>
+    <a:lvl8pPr marL="3200400" algn="l" defTabSz="457200" rtl="0" eaLnBrk="1" latinLnBrk="0" hangingPunct="1">
+      <a:defRPr sz="1200" kern="1200">
+        <a:solidFill>
+          <a:schemeClr val="tx1"/>
+        </a:solidFill>
+        <a:latin typeface="+mn-lt"/>
+        <a:ea typeface="+mn-ea"/>
+        <a:cs typeface="+mn-cs"/>
+      </a:defRPr>
+    </a:lvl8pPr>
+    <a:lvl9pPr marL="3657600" algn="l" defTabSz="457200" rtl="0" eaLnBrk="1" latinLnBrk="0" hangingPunct="1">
+      <a:defRPr sz="1200" kern="1200">
+        <a:solidFill>
+          <a:schemeClr val="tx1"/>
+        </a:solidFill>
+        <a:latin typeface="+mn-lt"/>
+        <a:ea typeface="+mn-ea"/>
+        <a:cs typeface="+mn-cs"/>
+      </a:defRPr>
+    </a:lvl9pPr>
+  </p:notesStyle>
+</p:notesMaster>
+</file>
+
+<file path=ppt/notesSlides/notesSlide1.xml><?xml version="1.0" encoding="utf-8"?>
+<p:notes xmlns:a="http://schemas.openxmlformats.org/drawingml/2006/main" xmlns:r="http://schemas.openxmlformats.org/officeDocument/2006/relationships" xmlns:p="http://schemas.openxmlformats.org/presentationml/2006/main">
+  <p:cSld>
+    <p:spTree>
+      <p:nvGrpSpPr>
+        <p:cNvPr id="1" name=""/>
+        <p:cNvGrpSpPr/>
+        <p:nvPr/>
+      </p:nvGrpSpPr>
+      <p:grpSpPr>
+        <a:xfrm>
+          <a:off x="0" y="0"/>
+          <a:ext cx="0" cy="0"/>
+          <a:chOff x="0" y="0"/>
+          <a:chExt cx="0" cy="0"/>
+        </a:xfrm>
+      </p:grpSpPr>
+      <p:sp>
+        <p:nvSpPr>
+          <p:cNvPr id="2" name="Slide Image Placeholder 1"/>
+          <p:cNvSpPr>
+            <a:spLocks noGrp="1" noRot="1" noChangeAspect="1"/>
+          </p:cNvSpPr>
+          <p:nvPr>
+            <p:ph type="sldImg"/>
+          </p:nvPr>
+        </p:nvSpPr>
+        <p:spPr/>
+      </p:sp>
+      <p:sp>
+        <p:nvSpPr>
+          <p:cNvPr id="3" name="Notes Placeholder 2"/>
+          <p:cNvSpPr>
+            <a:spLocks noGrp="1"/>
+          </p:cNvSpPr>
+          <p:nvPr>
+            <p:ph type="body" idx="1"/>
+          </p:nvPr>
+        </p:nvSpPr>
+        <p:spPr/>
+        <p:txBody>
+          <a:bodyPr/>
+          <a:lstStyle/>
+          <a:p>
+            <a:pPr marL="228600" indent="-228600">
+              <a:buAutoNum type="arabicParenR"/>
+            </a:pPr>
+            <a:r>
+              <a:rPr lang="en-US" dirty="0" smtClean="0"/>
+              <a:t>Induces</a:t>
+            </a:r>
+            <a:r>
+              <a:rPr lang="en-US" baseline="0" dirty="0" smtClean="0"/>
+              <a:t> gluconeogenesis</a:t>
+            </a:r>
+          </a:p>
+          <a:p>
+            <a:pPr marL="228600" indent="-228600">
+              <a:buAutoNum type="arabicParenR"/>
+            </a:pPr>
+            <a:r>
+              <a:rPr lang="en-US" baseline="0" dirty="0" smtClean="0"/>
+              <a:t>Induces protein/triglyceride breakdown</a:t>
+            </a:r>
+          </a:p>
+          <a:p>
+            <a:pPr marL="228600" indent="-228600">
+              <a:buAutoNum type="arabicParenR"/>
+            </a:pPr>
+            <a:r>
+              <a:rPr lang="en-US" baseline="0" dirty="0" smtClean="0"/>
+              <a:t>Promotes insulin resistance</a:t>
+            </a:r>
+            <a:endParaRPr lang="en-US" dirty="0"/>
+          </a:p>
+        </p:txBody>
+      </p:sp>
+      <p:sp>
+        <p:nvSpPr>
+          <p:cNvPr id="4" name="Slide Number Placeholder 3"/>
+          <p:cNvSpPr>
+            <a:spLocks noGrp="1"/>
+          </p:cNvSpPr>
+          <p:nvPr>
+            <p:ph type="sldNum" sz="quarter" idx="10"/>
+          </p:nvPr>
+        </p:nvSpPr>
+        <p:spPr/>
+        <p:txBody>
+          <a:bodyPr/>
+          <a:lstStyle/>
+          <a:p>
+            <a:fld id="{569ACDED-B45A-E249-B67B-638F9856466D}" type="slidenum">
+              <a:rPr lang="en-US" smtClean="0"/>
+              <a:t>17</a:t>
+            </a:fld>
+            <a:endParaRPr lang="en-US"/>
+          </a:p>
+        </p:txBody>
+      </p:sp>
+    </p:spTree>
+    <p:extLst>
+      <p:ext uri="{BB962C8B-B14F-4D97-AF65-F5344CB8AC3E}">
+        <p14:creationId xmlns:p14="http://schemas.microsoft.com/office/powerpoint/2010/main" val="26886347"/>
+      </p:ext>
+    </p:extLst>
+  </p:cSld>
+  <p:clrMapOvr>
+    <a:masterClrMapping/>
+  </p:clrMapOvr>
+</p:notes>
+</file>
+
+<file path=ppt/notesSlides/notesSlide2.xml><?xml version="1.0" encoding="utf-8"?>
+<p:notes xmlns:a="http://schemas.openxmlformats.org/drawingml/2006/main" xmlns:r="http://schemas.openxmlformats.org/officeDocument/2006/relationships" xmlns:p="http://schemas.openxmlformats.org/presentationml/2006/main">
+  <p:cSld>
+    <p:spTree>
+      <p:nvGrpSpPr>
+        <p:cNvPr id="1" name=""/>
+        <p:cNvGrpSpPr/>
+        <p:nvPr/>
+      </p:nvGrpSpPr>
+      <p:grpSpPr>
+        <a:xfrm>
+          <a:off x="0" y="0"/>
+          <a:ext cx="0" cy="0"/>
+          <a:chOff x="0" y="0"/>
+          <a:chExt cx="0" cy="0"/>
+        </a:xfrm>
+      </p:grpSpPr>
+      <p:sp>
+        <p:nvSpPr>
+          <p:cNvPr id="2" name="Slide Image Placeholder 1"/>
+          <p:cNvSpPr>
+            <a:spLocks noGrp="1" noRot="1" noChangeAspect="1"/>
+          </p:cNvSpPr>
+          <p:nvPr>
+            <p:ph type="sldImg"/>
+          </p:nvPr>
+        </p:nvSpPr>
+        <p:spPr/>
+      </p:sp>
+      <p:sp>
+        <p:nvSpPr>
+          <p:cNvPr id="3" name="Notes Placeholder 2"/>
+          <p:cNvSpPr>
+            <a:spLocks noGrp="1"/>
+          </p:cNvSpPr>
+          <p:nvPr>
+            <p:ph type="body" idx="1"/>
+          </p:nvPr>
+        </p:nvSpPr>
+        <p:spPr/>
+        <p:txBody>
+          <a:bodyPr/>
+          <a:lstStyle/>
+          <a:p>
+            <a:r>
+              <a:rPr lang="en-US" dirty="0" err="1" smtClean="0"/>
+              <a:t>Fedex</a:t>
+            </a:r>
+            <a:r>
+              <a:rPr lang="en-US" dirty="0" smtClean="0"/>
+              <a:t> workers</a:t>
+            </a:r>
+            <a:endParaRPr lang="en-US" dirty="0"/>
+          </a:p>
+        </p:txBody>
+      </p:sp>
+      <p:sp>
+        <p:nvSpPr>
+          <p:cNvPr id="4" name="Slide Number Placeholder 3"/>
+          <p:cNvSpPr>
+            <a:spLocks noGrp="1"/>
+          </p:cNvSpPr>
+          <p:nvPr>
+            <p:ph type="sldNum" sz="quarter" idx="10"/>
+          </p:nvPr>
+        </p:nvSpPr>
+        <p:spPr/>
+        <p:txBody>
+          <a:bodyPr/>
+          <a:lstStyle/>
+          <a:p>
+            <a:fld id="{569ACDED-B45A-E249-B67B-638F9856466D}" type="slidenum">
+              <a:rPr lang="en-US" smtClean="0"/>
+              <a:t>21</a:t>
+            </a:fld>
+            <a:endParaRPr lang="en-US"/>
+          </a:p>
+        </p:txBody>
+      </p:sp>
+    </p:spTree>
+    <p:extLst>
+      <p:ext uri="{BB962C8B-B14F-4D97-AF65-F5344CB8AC3E}">
+        <p14:creationId xmlns:p14="http://schemas.microsoft.com/office/powerpoint/2010/main" val="2109612146"/>
+      </p:ext>
+    </p:extLst>
+  </p:cSld>
+  <p:clrMapOvr>
+    <a:masterClrMapping/>
+  </p:clrMapOvr>
+</p:notes>
+</file>
+
+<file path=ppt/notesSlides/notesSlide3.xml><?xml version="1.0" encoding="utf-8"?>
+<p:notes xmlns:a="http://schemas.openxmlformats.org/drawingml/2006/main" xmlns:r="http://schemas.openxmlformats.org/officeDocument/2006/relationships" xmlns:p="http://schemas.openxmlformats.org/presentationml/2006/main">
+  <p:cSld>
+    <p:spTree>
+      <p:nvGrpSpPr>
+        <p:cNvPr id="1" name=""/>
+        <p:cNvGrpSpPr/>
+        <p:nvPr/>
+      </p:nvGrpSpPr>
+      <p:grpSpPr>
+        <a:xfrm>
+          <a:off x="0" y="0"/>
+          <a:ext cx="0" cy="0"/>
+          <a:chOff x="0" y="0"/>
+          <a:chExt cx="0" cy="0"/>
+        </a:xfrm>
+      </p:grpSpPr>
+      <p:sp>
+        <p:nvSpPr>
+          <p:cNvPr id="2" name="Slide Image Placeholder 1"/>
+          <p:cNvSpPr>
+            <a:spLocks noGrp="1" noRot="1" noChangeAspect="1"/>
+          </p:cNvSpPr>
+          <p:nvPr>
+            <p:ph type="sldImg"/>
+          </p:nvPr>
+        </p:nvSpPr>
+        <p:spPr/>
+      </p:sp>
+      <p:sp>
+        <p:nvSpPr>
+          <p:cNvPr id="3" name="Notes Placeholder 2"/>
+          <p:cNvSpPr>
+            <a:spLocks noGrp="1"/>
+          </p:cNvSpPr>
+          <p:nvPr>
+            <p:ph type="body" idx="1"/>
+          </p:nvPr>
+        </p:nvSpPr>
+        <p:spPr/>
+        <p:txBody>
+          <a:bodyPr/>
+          <a:lstStyle/>
+          <a:p>
+            <a:r>
+              <a:rPr lang="en-US" dirty="0" smtClean="0"/>
+              <a:t>Hyperpigmentation is due to constant</a:t>
+            </a:r>
+            <a:r>
+              <a:rPr lang="en-US" baseline="0" dirty="0" smtClean="0"/>
+              <a:t> release of ACTH/MSH which are both part of POMC.  This is because of reduced negative feedback of Cortisol onto the ACTH releasing cells/</a:t>
+            </a:r>
+            <a:endParaRPr lang="en-US" dirty="0"/>
+          </a:p>
+        </p:txBody>
+      </p:sp>
+      <p:sp>
+        <p:nvSpPr>
+          <p:cNvPr id="4" name="Slide Number Placeholder 3"/>
+          <p:cNvSpPr>
+            <a:spLocks noGrp="1"/>
+          </p:cNvSpPr>
+          <p:nvPr>
+            <p:ph type="sldNum" sz="quarter" idx="10"/>
+          </p:nvPr>
+        </p:nvSpPr>
+        <p:spPr/>
+        <p:txBody>
+          <a:bodyPr/>
+          <a:lstStyle/>
+          <a:p>
+            <a:fld id="{569ACDED-B45A-E249-B67B-638F9856466D}" type="slidenum">
+              <a:rPr lang="en-US" smtClean="0"/>
+              <a:t>23</a:t>
+            </a:fld>
+            <a:endParaRPr lang="en-US"/>
+          </a:p>
+        </p:txBody>
+      </p:sp>
+    </p:spTree>
+    <p:extLst>
+      <p:ext uri="{BB962C8B-B14F-4D97-AF65-F5344CB8AC3E}">
+        <p14:creationId xmlns:p14="http://schemas.microsoft.com/office/powerpoint/2010/main" val="1943413890"/>
+      </p:ext>
+    </p:extLst>
+  </p:cSld>
+  <p:clrMapOvr>
+    <a:masterClrMapping/>
+  </p:clrMapOvr>
+</p:notes>
 </file>
 
 <file path=ppt/slideLayouts/slideLayout1.xml><?xml version="1.0" encoding="utf-8"?>
@@ -306,7 +997,7 @@
           <a:p>
             <a:fld id="{372065D1-A481-6A4B-B2A3-5DBBAEFD44E3}" type="datetimeFigureOut">
               <a:rPr lang="en-US" smtClean="0"/>
-              <a:t>3/17/15</a:t>
+              <a:t>3/18/15</a:t>
             </a:fld>
             <a:endParaRPr lang="en-US"/>
           </a:p>
@@ -476,7 +1167,7 @@
           <a:p>
             <a:fld id="{372065D1-A481-6A4B-B2A3-5DBBAEFD44E3}" type="datetimeFigureOut">
               <a:rPr lang="en-US" smtClean="0"/>
-              <a:t>3/17/15</a:t>
+              <a:t>3/18/15</a:t>
             </a:fld>
             <a:endParaRPr lang="en-US"/>
           </a:p>
@@ -656,7 +1347,7 @@
           <a:p>
             <a:fld id="{372065D1-A481-6A4B-B2A3-5DBBAEFD44E3}" type="datetimeFigureOut">
               <a:rPr lang="en-US" smtClean="0"/>
-              <a:t>3/17/15</a:t>
+              <a:t>3/18/15</a:t>
             </a:fld>
             <a:endParaRPr lang="en-US"/>
           </a:p>
@@ -826,7 +1517,7 @@
           <a:p>
             <a:fld id="{372065D1-A481-6A4B-B2A3-5DBBAEFD44E3}" type="datetimeFigureOut">
               <a:rPr lang="en-US" smtClean="0"/>
-              <a:t>3/17/15</a:t>
+              <a:t>3/18/15</a:t>
             </a:fld>
             <a:endParaRPr lang="en-US"/>
           </a:p>
@@ -1072,7 +1763,7 @@
           <a:p>
             <a:fld id="{372065D1-A481-6A4B-B2A3-5DBBAEFD44E3}" type="datetimeFigureOut">
               <a:rPr lang="en-US" smtClean="0"/>
-              <a:t>3/17/15</a:t>
+              <a:t>3/18/15</a:t>
             </a:fld>
             <a:endParaRPr lang="en-US"/>
           </a:p>
@@ -1360,7 +2051,7 @@
           <a:p>
             <a:fld id="{372065D1-A481-6A4B-B2A3-5DBBAEFD44E3}" type="datetimeFigureOut">
               <a:rPr lang="en-US" smtClean="0"/>
-              <a:t>3/17/15</a:t>
+              <a:t>3/18/15</a:t>
             </a:fld>
             <a:endParaRPr lang="en-US"/>
           </a:p>
@@ -1782,7 +2473,7 @@
           <a:p>
             <a:fld id="{372065D1-A481-6A4B-B2A3-5DBBAEFD44E3}" type="datetimeFigureOut">
               <a:rPr lang="en-US" smtClean="0"/>
-              <a:t>3/17/15</a:t>
+              <a:t>3/18/15</a:t>
             </a:fld>
             <a:endParaRPr lang="en-US"/>
           </a:p>
@@ -1900,7 +2591,7 @@
           <a:p>
             <a:fld id="{372065D1-A481-6A4B-B2A3-5DBBAEFD44E3}" type="datetimeFigureOut">
               <a:rPr lang="en-US" smtClean="0"/>
-              <a:t>3/17/15</a:t>
+              <a:t>3/18/15</a:t>
             </a:fld>
             <a:endParaRPr lang="en-US"/>
           </a:p>
@@ -1995,7 +2686,7 @@
           <a:p>
             <a:fld id="{372065D1-A481-6A4B-B2A3-5DBBAEFD44E3}" type="datetimeFigureOut">
               <a:rPr lang="en-US" smtClean="0"/>
-              <a:t>3/17/15</a:t>
+              <a:t>3/18/15</a:t>
             </a:fld>
             <a:endParaRPr lang="en-US"/>
           </a:p>
@@ -2272,7 +2963,7 @@
           <a:p>
             <a:fld id="{372065D1-A481-6A4B-B2A3-5DBBAEFD44E3}" type="datetimeFigureOut">
               <a:rPr lang="en-US" smtClean="0"/>
-              <a:t>3/17/15</a:t>
+              <a:t>3/18/15</a:t>
             </a:fld>
             <a:endParaRPr lang="en-US"/>
           </a:p>
@@ -2525,7 +3216,7 @@
           <a:p>
             <a:fld id="{372065D1-A481-6A4B-B2A3-5DBBAEFD44E3}" type="datetimeFigureOut">
               <a:rPr lang="en-US" smtClean="0"/>
-              <a:t>3/17/15</a:t>
+              <a:t>3/18/15</a:t>
             </a:fld>
             <a:endParaRPr lang="en-US"/>
           </a:p>
@@ -2738,7 +3429,7 @@
           <a:p>
             <a:fld id="{372065D1-A481-6A4B-B2A3-5DBBAEFD44E3}" type="datetimeFigureOut">
               <a:rPr lang="en-US" smtClean="0"/>
-              <a:t>3/17/15</a:t>
+              <a:t>3/18/15</a:t>
             </a:fld>
             <a:endParaRPr lang="en-US"/>
           </a:p>
@@ -4140,6 +4831,144 @@
             <p:ph type="title"/>
           </p:nvPr>
         </p:nvSpPr>
+        <p:spPr/>
+        <p:txBody>
+          <a:bodyPr/>
+          <a:lstStyle/>
+          <a:p>
+            <a:r>
+              <a:rPr lang="en-US" dirty="0" smtClean="0"/>
+              <a:t>Daily Rhythms of Cortisol Release</a:t>
+            </a:r>
+            <a:endParaRPr lang="en-US" dirty="0"/>
+          </a:p>
+        </p:txBody>
+      </p:sp>
+      <p:pic>
+        <p:nvPicPr>
+          <p:cNvPr id="3" name="Picture 2"/>
+          <p:cNvPicPr>
+            <a:picLocks noChangeAspect="1"/>
+          </p:cNvPicPr>
+          <p:nvPr/>
+        </p:nvPicPr>
+        <p:blipFill>
+          <a:blip r:embed="rId2"/>
+          <a:stretch>
+            <a:fillRect/>
+          </a:stretch>
+        </p:blipFill>
+        <p:spPr>
+          <a:xfrm>
+            <a:off x="1384300" y="1386595"/>
+            <a:ext cx="5740710" cy="4417306"/>
+          </a:xfrm>
+          <a:prstGeom prst="rect">
+            <a:avLst/>
+          </a:prstGeom>
+        </p:spPr>
+      </p:pic>
+      <p:sp>
+        <p:nvSpPr>
+          <p:cNvPr id="4" name="TextBox 3"/>
+          <p:cNvSpPr txBox="1"/>
+          <p:nvPr/>
+        </p:nvSpPr>
+        <p:spPr>
+          <a:xfrm>
+            <a:off x="3556000" y="5972770"/>
+            <a:ext cx="5588000" cy="923330"/>
+          </a:xfrm>
+          <a:prstGeom prst="rect">
+            <a:avLst/>
+          </a:prstGeom>
+          <a:noFill/>
+        </p:spPr>
+        <p:txBody>
+          <a:bodyPr wrap="square" rtlCol="0">
+            <a:spAutoFit/>
+          </a:bodyPr>
+          <a:lstStyle/>
+          <a:p>
+            <a:r>
+              <a:rPr lang="en-US" dirty="0" err="1" smtClean="0"/>
+              <a:t>Liddle</a:t>
+            </a:r>
+            <a:r>
+              <a:rPr lang="en-US" dirty="0" smtClean="0"/>
+              <a:t> </a:t>
+            </a:r>
+            <a:r>
+              <a:rPr lang="en-US" dirty="0"/>
+              <a:t>GW (1966) An analysis of circadian rhythms in human adrenocortical secretory activity. Trans Am </a:t>
+            </a:r>
+            <a:r>
+              <a:rPr lang="en-US" dirty="0" err="1"/>
+              <a:t>Clin</a:t>
+            </a:r>
+            <a:r>
+              <a:rPr lang="en-US" dirty="0"/>
+              <a:t> </a:t>
+            </a:r>
+            <a:r>
+              <a:rPr lang="en-US" dirty="0" err="1"/>
+              <a:t>Clim</a:t>
+            </a:r>
+            <a:r>
+              <a:rPr lang="en-US" dirty="0"/>
+              <a:t> </a:t>
+            </a:r>
+            <a:r>
+              <a:rPr lang="en-US" dirty="0" err="1"/>
+              <a:t>Assoc</a:t>
+            </a:r>
+            <a:r>
+              <a:rPr lang="en-US" dirty="0"/>
+              <a:t> 77: 151–160.</a:t>
+            </a:r>
+          </a:p>
+        </p:txBody>
+      </p:sp>
+    </p:spTree>
+    <p:extLst>
+      <p:ext uri="{BB962C8B-B14F-4D97-AF65-F5344CB8AC3E}">
+        <p14:creationId xmlns:p14="http://schemas.microsoft.com/office/powerpoint/2010/main" val="2406797703"/>
+      </p:ext>
+    </p:extLst>
+  </p:cSld>
+  <p:clrMapOvr>
+    <a:masterClrMapping/>
+  </p:clrMapOvr>
+</p:sld>
+</file>
+
+<file path=ppt/slides/slide17.xml><?xml version="1.0" encoding="utf-8"?>
+<p:sld xmlns:a="http://schemas.openxmlformats.org/drawingml/2006/main" xmlns:r="http://schemas.openxmlformats.org/officeDocument/2006/relationships" xmlns:p="http://schemas.openxmlformats.org/presentationml/2006/main">
+  <p:cSld>
+    <p:spTree>
+      <p:nvGrpSpPr>
+        <p:cNvPr id="1" name=""/>
+        <p:cNvGrpSpPr/>
+        <p:nvPr/>
+      </p:nvGrpSpPr>
+      <p:grpSpPr>
+        <a:xfrm>
+          <a:off x="0" y="0"/>
+          <a:ext cx="0" cy="0"/>
+          <a:chOff x="0" y="0"/>
+          <a:chExt cx="0" cy="0"/>
+        </a:xfrm>
+      </p:grpSpPr>
+      <p:sp>
+        <p:nvSpPr>
+          <p:cNvPr id="2" name="Title 1"/>
+          <p:cNvSpPr>
+            <a:spLocks noGrp="1"/>
+          </p:cNvSpPr>
+          <p:nvPr>
+            <p:ph type="title"/>
+          </p:nvPr>
+        </p:nvSpPr>
         <p:spPr>
           <a:xfrm>
             <a:off x="165100" y="274638"/>
@@ -4169,7 +4998,7 @@
           <p:nvPr/>
         </p:nvPicPr>
         <p:blipFill>
-          <a:blip r:embed="rId2">
+          <a:blip r:embed="rId3">
             <a:extLst>
               <a:ext uri="{28A0092B-C50C-407E-A947-70E740481C1C}">
                 <a14:useLocalDpi xmlns:a14="http://schemas.microsoft.com/office/drawing/2010/main" val="0"/>
@@ -4203,7 +5032,7 @@
 </p:sld>
 </file>
 
-<file path=ppt/slides/slide17.xml><?xml version="1.0" encoding="utf-8"?>
+<file path=ppt/slides/slide18.xml><?xml version="1.0" encoding="utf-8"?>
 <p:sld xmlns:a="http://schemas.openxmlformats.org/drawingml/2006/main" xmlns:r="http://schemas.openxmlformats.org/officeDocument/2006/relationships" xmlns:p="http://schemas.openxmlformats.org/presentationml/2006/main">
   <p:cSld>
     <p:spTree>
@@ -4310,7 +5139,7 @@
 </p:sld>
 </file>
 
-<file path=ppt/slides/slide18.xml><?xml version="1.0" encoding="utf-8"?>
+<file path=ppt/slides/slide19.xml><?xml version="1.0" encoding="utf-8"?>
 <p:sld xmlns:a="http://schemas.openxmlformats.org/drawingml/2006/main" xmlns:r="http://schemas.openxmlformats.org/officeDocument/2006/relationships" xmlns:p="http://schemas.openxmlformats.org/presentationml/2006/main">
   <p:cSld>
     <p:spTree>
@@ -4400,78 +5229,6 @@
 </p:sld>
 </file>
 
-<file path=ppt/slides/slide19.xml><?xml version="1.0" encoding="utf-8"?>
-<p:sld xmlns:a="http://schemas.openxmlformats.org/drawingml/2006/main" xmlns:r="http://schemas.openxmlformats.org/officeDocument/2006/relationships" xmlns:p="http://schemas.openxmlformats.org/presentationml/2006/main">
-  <p:cSld>
-    <p:spTree>
-      <p:nvGrpSpPr>
-        <p:cNvPr id="1" name=""/>
-        <p:cNvGrpSpPr/>
-        <p:nvPr/>
-      </p:nvGrpSpPr>
-      <p:grpSpPr>
-        <a:xfrm>
-          <a:off x="0" y="0"/>
-          <a:ext cx="0" cy="0"/>
-          <a:chOff x="0" y="0"/>
-          <a:chExt cx="0" cy="0"/>
-        </a:xfrm>
-      </p:grpSpPr>
-      <p:sp>
-        <p:nvSpPr>
-          <p:cNvPr id="4" name="Title 3"/>
-          <p:cNvSpPr>
-            <a:spLocks noGrp="1"/>
-          </p:cNvSpPr>
-          <p:nvPr>
-            <p:ph type="title"/>
-          </p:nvPr>
-        </p:nvSpPr>
-        <p:spPr/>
-        <p:txBody>
-          <a:bodyPr/>
-          <a:lstStyle/>
-          <a:p>
-            <a:r>
-              <a:rPr lang="en-US" dirty="0" smtClean="0"/>
-              <a:t>Adrenaline Mediates Short-Term Stress Responses</a:t>
-            </a:r>
-            <a:endParaRPr lang="en-US" dirty="0"/>
-          </a:p>
-        </p:txBody>
-      </p:sp>
-      <p:sp>
-        <p:nvSpPr>
-          <p:cNvPr id="5" name="Text Placeholder 4"/>
-          <p:cNvSpPr>
-            <a:spLocks noGrp="1"/>
-          </p:cNvSpPr>
-          <p:nvPr>
-            <p:ph type="body" idx="1"/>
-          </p:nvPr>
-        </p:nvSpPr>
-        <p:spPr/>
-        <p:txBody>
-          <a:bodyPr/>
-          <a:lstStyle/>
-          <a:p>
-            <a:endParaRPr lang="en-US"/>
-          </a:p>
-        </p:txBody>
-      </p:sp>
-    </p:spTree>
-    <p:extLst>
-      <p:ext uri="{BB962C8B-B14F-4D97-AF65-F5344CB8AC3E}">
-        <p14:creationId xmlns:p14="http://schemas.microsoft.com/office/powerpoint/2010/main" val="3134858806"/>
-      </p:ext>
-    </p:extLst>
-  </p:cSld>
-  <p:clrMapOvr>
-    <a:masterClrMapping/>
-  </p:clrMapOvr>
-</p:sld>
-</file>
-
 <file path=ppt/slides/slide2.xml><?xml version="1.0" encoding="utf-8"?>
 <p:sld xmlns:a="http://schemas.openxmlformats.org/drawingml/2006/main" xmlns:r="http://schemas.openxmlformats.org/officeDocument/2006/relationships" xmlns:p="http://schemas.openxmlformats.org/presentationml/2006/main">
   <p:cSld>
@@ -4675,6 +5432,735 @@
     <p:extLst>
       <p:ext uri="{BB962C8B-B14F-4D97-AF65-F5344CB8AC3E}">
         <p14:creationId xmlns:p14="http://schemas.microsoft.com/office/powerpoint/2010/main" val="2667582802"/>
+      </p:ext>
+    </p:extLst>
+  </p:cSld>
+  <p:clrMapOvr>
+    <a:masterClrMapping/>
+  </p:clrMapOvr>
+</p:sld>
+</file>
+
+<file path=ppt/slides/slide20.xml><?xml version="1.0" encoding="utf-8"?>
+<p:sld xmlns:a="http://schemas.openxmlformats.org/drawingml/2006/main" xmlns:r="http://schemas.openxmlformats.org/officeDocument/2006/relationships" xmlns:p="http://schemas.openxmlformats.org/presentationml/2006/main">
+  <p:cSld>
+    <p:spTree>
+      <p:nvGrpSpPr>
+        <p:cNvPr id="1" name=""/>
+        <p:cNvGrpSpPr/>
+        <p:nvPr/>
+      </p:nvGrpSpPr>
+      <p:grpSpPr>
+        <a:xfrm>
+          <a:off x="0" y="0"/>
+          <a:ext cx="0" cy="0"/>
+          <a:chOff x="0" y="0"/>
+          <a:chExt cx="0" cy="0"/>
+        </a:xfrm>
+      </p:grpSpPr>
+      <p:sp>
+        <p:nvSpPr>
+          <p:cNvPr id="3" name="Title 2"/>
+          <p:cNvSpPr>
+            <a:spLocks noGrp="1"/>
+          </p:cNvSpPr>
+          <p:nvPr>
+            <p:ph type="title"/>
+          </p:nvPr>
+        </p:nvSpPr>
+        <p:spPr/>
+        <p:txBody>
+          <a:bodyPr/>
+          <a:lstStyle/>
+          <a:p>
+            <a:r>
+              <a:rPr lang="en-US" dirty="0" smtClean="0"/>
+              <a:t>Adrenal Steroid Hormone </a:t>
+            </a:r>
+            <a:r>
+              <a:rPr lang="en-US" dirty="0" err="1" smtClean="0"/>
+              <a:t>Disfunction</a:t>
+            </a:r>
+            <a:endParaRPr lang="en-US" dirty="0"/>
+          </a:p>
+        </p:txBody>
+      </p:sp>
+      <p:sp>
+        <p:nvSpPr>
+          <p:cNvPr id="4" name="Text Placeholder 3"/>
+          <p:cNvSpPr>
+            <a:spLocks noGrp="1"/>
+          </p:cNvSpPr>
+          <p:nvPr>
+            <p:ph type="body" idx="1"/>
+          </p:nvPr>
+        </p:nvSpPr>
+        <p:spPr/>
+        <p:txBody>
+          <a:bodyPr/>
+          <a:lstStyle/>
+          <a:p>
+            <a:endParaRPr lang="en-US"/>
+          </a:p>
+        </p:txBody>
+      </p:sp>
+    </p:spTree>
+    <p:extLst>
+      <p:ext uri="{BB962C8B-B14F-4D97-AF65-F5344CB8AC3E}">
+        <p14:creationId xmlns:p14="http://schemas.microsoft.com/office/powerpoint/2010/main" val="1174222930"/>
+      </p:ext>
+    </p:extLst>
+  </p:cSld>
+  <p:clrMapOvr>
+    <a:masterClrMapping/>
+  </p:clrMapOvr>
+</p:sld>
+</file>
+
+<file path=ppt/slides/slide21.xml><?xml version="1.0" encoding="utf-8"?>
+<p:sld xmlns:a="http://schemas.openxmlformats.org/drawingml/2006/main" xmlns:r="http://schemas.openxmlformats.org/officeDocument/2006/relationships" xmlns:p="http://schemas.openxmlformats.org/presentationml/2006/main">
+  <p:cSld>
+    <p:spTree>
+      <p:nvGrpSpPr>
+        <p:cNvPr id="1" name=""/>
+        <p:cNvGrpSpPr/>
+        <p:nvPr/>
+      </p:nvGrpSpPr>
+      <p:grpSpPr>
+        <a:xfrm>
+          <a:off x="0" y="0"/>
+          <a:ext cx="0" cy="0"/>
+          <a:chOff x="0" y="0"/>
+          <a:chExt cx="0" cy="0"/>
+        </a:xfrm>
+      </p:grpSpPr>
+      <p:sp>
+        <p:nvSpPr>
+          <p:cNvPr id="2" name="Title 1"/>
+          <p:cNvSpPr>
+            <a:spLocks noGrp="1"/>
+          </p:cNvSpPr>
+          <p:nvPr>
+            <p:ph type="title"/>
+          </p:nvPr>
+        </p:nvSpPr>
+        <p:spPr/>
+        <p:txBody>
+          <a:bodyPr/>
+          <a:lstStyle/>
+          <a:p>
+            <a:r>
+              <a:rPr lang="en-US" dirty="0" smtClean="0"/>
+              <a:t>Night Time Workers</a:t>
+            </a:r>
+            <a:endParaRPr lang="en-US" dirty="0"/>
+          </a:p>
+        </p:txBody>
+      </p:sp>
+      <p:pic>
+        <p:nvPicPr>
+          <p:cNvPr id="4" name="Picture 3"/>
+          <p:cNvPicPr>
+            <a:picLocks noChangeAspect="1"/>
+          </p:cNvPicPr>
+          <p:nvPr/>
+        </p:nvPicPr>
+        <p:blipFill>
+          <a:blip r:embed="rId3"/>
+          <a:stretch>
+            <a:fillRect/>
+          </a:stretch>
+        </p:blipFill>
+        <p:spPr>
+          <a:xfrm>
+            <a:off x="2209800" y="1765300"/>
+            <a:ext cx="4711700" cy="3314700"/>
+          </a:xfrm>
+          <a:prstGeom prst="rect">
+            <a:avLst/>
+          </a:prstGeom>
+        </p:spPr>
+      </p:pic>
+      <p:sp>
+        <p:nvSpPr>
+          <p:cNvPr id="5" name="TextBox 4"/>
+          <p:cNvSpPr txBox="1"/>
+          <p:nvPr/>
+        </p:nvSpPr>
+        <p:spPr>
+          <a:xfrm>
+            <a:off x="2755900" y="5651500"/>
+            <a:ext cx="6388100" cy="1200329"/>
+          </a:xfrm>
+          <a:prstGeom prst="rect">
+            <a:avLst/>
+          </a:prstGeom>
+          <a:noFill/>
+        </p:spPr>
+        <p:txBody>
+          <a:bodyPr wrap="square" rtlCol="0">
+            <a:spAutoFit/>
+          </a:bodyPr>
+          <a:lstStyle/>
+          <a:p>
+            <a:r>
+              <a:rPr lang="en-US" dirty="0" err="1" smtClean="0"/>
+              <a:t>Scheer</a:t>
+            </a:r>
+            <a:r>
+              <a:rPr lang="en-US" dirty="0" smtClean="0"/>
+              <a:t> </a:t>
+            </a:r>
+            <a:r>
+              <a:rPr lang="en-US" dirty="0"/>
+              <a:t>F A</a:t>
+            </a:r>
+            <a:r>
+              <a:rPr lang="en-US" dirty="0" smtClean="0"/>
+              <a:t>JL</a:t>
+            </a:r>
+            <a:r>
+              <a:rPr lang="en-US" dirty="0"/>
+              <a:t>, Hilton MF, </a:t>
+            </a:r>
+            <a:r>
+              <a:rPr lang="en-US" dirty="0" err="1"/>
+              <a:t>Mantzoros</a:t>
+            </a:r>
+            <a:r>
+              <a:rPr lang="en-US" dirty="0"/>
+              <a:t> CS, Shea S </a:t>
+            </a:r>
+            <a:r>
+              <a:rPr lang="en-US" dirty="0" smtClean="0"/>
+              <a:t>A </a:t>
+            </a:r>
+            <a:r>
+              <a:rPr lang="en-US" dirty="0"/>
+              <a:t>(2009) Adverse metabolic and cardiovascular consequences of circadian misalignment. </a:t>
+            </a:r>
+            <a:r>
+              <a:rPr lang="en-US" dirty="0" err="1"/>
+              <a:t>Proc</a:t>
+            </a:r>
+            <a:r>
+              <a:rPr lang="en-US" dirty="0"/>
+              <a:t> </a:t>
+            </a:r>
+            <a:r>
+              <a:rPr lang="en-US" dirty="0" err="1"/>
+              <a:t>Natl</a:t>
+            </a:r>
+            <a:r>
+              <a:rPr lang="en-US" dirty="0"/>
+              <a:t> </a:t>
+            </a:r>
+            <a:r>
+              <a:rPr lang="en-US" dirty="0" err="1"/>
+              <a:t>Acad</a:t>
+            </a:r>
+            <a:r>
+              <a:rPr lang="en-US" dirty="0"/>
+              <a:t> </a:t>
+            </a:r>
+            <a:r>
+              <a:rPr lang="en-US" dirty="0" err="1"/>
+              <a:t>Sci</a:t>
+            </a:r>
+            <a:r>
+              <a:rPr lang="en-US" dirty="0"/>
+              <a:t> U S A 106: 4453–4458. doi:10.1073/pnas.0808180106.</a:t>
+            </a:r>
+          </a:p>
+        </p:txBody>
+      </p:sp>
+      <p:sp>
+        <p:nvSpPr>
+          <p:cNvPr id="6" name="TextBox 5"/>
+          <p:cNvSpPr txBox="1"/>
+          <p:nvPr/>
+        </p:nvSpPr>
+        <p:spPr>
+          <a:xfrm>
+            <a:off x="7086600" y="2209800"/>
+            <a:ext cx="1647882" cy="646331"/>
+          </a:xfrm>
+          <a:prstGeom prst="rect">
+            <a:avLst/>
+          </a:prstGeom>
+          <a:noFill/>
+        </p:spPr>
+        <p:txBody>
+          <a:bodyPr wrap="none" rtlCol="0">
+            <a:spAutoFit/>
+          </a:bodyPr>
+          <a:lstStyle/>
+          <a:p>
+            <a:r>
+              <a:rPr lang="en-US" dirty="0" smtClean="0">
+                <a:solidFill>
+                  <a:srgbClr val="008000"/>
+                </a:solidFill>
+              </a:rPr>
+              <a:t>Normal</a:t>
+            </a:r>
+          </a:p>
+          <a:p>
+            <a:r>
+              <a:rPr lang="en-US" dirty="0" smtClean="0">
+                <a:solidFill>
+                  <a:srgbClr val="FF0000"/>
+                </a:solidFill>
+              </a:rPr>
+              <a:t>Sleep disrupted</a:t>
+            </a:r>
+            <a:endParaRPr lang="en-US" dirty="0">
+              <a:solidFill>
+                <a:srgbClr val="FF0000"/>
+              </a:solidFill>
+            </a:endParaRPr>
+          </a:p>
+        </p:txBody>
+      </p:sp>
+    </p:spTree>
+    <p:extLst>
+      <p:ext uri="{BB962C8B-B14F-4D97-AF65-F5344CB8AC3E}">
+        <p14:creationId xmlns:p14="http://schemas.microsoft.com/office/powerpoint/2010/main" val="1695007238"/>
+      </p:ext>
+    </p:extLst>
+  </p:cSld>
+  <p:clrMapOvr>
+    <a:masterClrMapping/>
+  </p:clrMapOvr>
+</p:sld>
+</file>
+
+<file path=ppt/slides/slide22.xml><?xml version="1.0" encoding="utf-8"?>
+<p:sld xmlns:a="http://schemas.openxmlformats.org/drawingml/2006/main" xmlns:r="http://schemas.openxmlformats.org/officeDocument/2006/relationships" xmlns:p="http://schemas.openxmlformats.org/presentationml/2006/main">
+  <p:cSld>
+    <p:spTree>
+      <p:nvGrpSpPr>
+        <p:cNvPr id="1" name=""/>
+        <p:cNvGrpSpPr/>
+        <p:nvPr/>
+      </p:nvGrpSpPr>
+      <p:grpSpPr>
+        <a:xfrm>
+          <a:off x="0" y="0"/>
+          <a:ext cx="0" cy="0"/>
+          <a:chOff x="0" y="0"/>
+          <a:chExt cx="0" cy="0"/>
+        </a:xfrm>
+      </p:grpSpPr>
+      <p:sp>
+        <p:nvSpPr>
+          <p:cNvPr id="2" name="Title 1"/>
+          <p:cNvSpPr>
+            <a:spLocks noGrp="1"/>
+          </p:cNvSpPr>
+          <p:nvPr>
+            <p:ph type="title"/>
+          </p:nvPr>
+        </p:nvSpPr>
+        <p:spPr/>
+        <p:txBody>
+          <a:bodyPr/>
+          <a:lstStyle/>
+          <a:p>
+            <a:r>
+              <a:rPr lang="en-US" dirty="0" smtClean="0"/>
+              <a:t>Discuss</a:t>
+            </a:r>
+            <a:endParaRPr lang="en-US" dirty="0"/>
+          </a:p>
+        </p:txBody>
+      </p:sp>
+      <p:sp>
+        <p:nvSpPr>
+          <p:cNvPr id="4" name="Content Placeholder 3"/>
+          <p:cNvSpPr>
+            <a:spLocks noGrp="1"/>
+          </p:cNvSpPr>
+          <p:nvPr>
+            <p:ph idx="1"/>
+          </p:nvPr>
+        </p:nvSpPr>
+        <p:spPr/>
+        <p:txBody>
+          <a:bodyPr/>
+          <a:lstStyle/>
+          <a:p>
+            <a:r>
+              <a:rPr lang="en-US" dirty="0"/>
+              <a:t>Congenital Adrenal Hyperplasia</a:t>
+            </a:r>
+            <a:endParaRPr lang="en-US" dirty="0" smtClean="0"/>
+          </a:p>
+          <a:p>
+            <a:r>
+              <a:rPr lang="en-US" dirty="0" smtClean="0"/>
+              <a:t>Mutations in biosynthesis of cortisol/aldosterone</a:t>
+            </a:r>
+          </a:p>
+          <a:p>
+            <a:r>
+              <a:rPr lang="en-US" dirty="0" smtClean="0"/>
+              <a:t>What would be the effects on</a:t>
+            </a:r>
+          </a:p>
+          <a:p>
+            <a:pPr lvl="1"/>
+            <a:r>
+              <a:rPr lang="en-US" dirty="0" smtClean="0"/>
+              <a:t>Sex hormone production</a:t>
+            </a:r>
+          </a:p>
+          <a:p>
+            <a:pPr lvl="1"/>
+            <a:r>
+              <a:rPr lang="en-US" dirty="0" smtClean="0"/>
+              <a:t>Salt balance</a:t>
+            </a:r>
+          </a:p>
+          <a:p>
+            <a:pPr lvl="1"/>
+            <a:r>
+              <a:rPr lang="en-US" dirty="0" smtClean="0"/>
+              <a:t>Adrenal size</a:t>
+            </a:r>
+          </a:p>
+          <a:p>
+            <a:endParaRPr lang="en-US" dirty="0"/>
+          </a:p>
+        </p:txBody>
+      </p:sp>
+    </p:spTree>
+    <p:extLst>
+      <p:ext uri="{BB962C8B-B14F-4D97-AF65-F5344CB8AC3E}">
+        <p14:creationId xmlns:p14="http://schemas.microsoft.com/office/powerpoint/2010/main" val="1174011585"/>
+      </p:ext>
+    </p:extLst>
+  </p:cSld>
+  <p:clrMapOvr>
+    <a:masterClrMapping/>
+  </p:clrMapOvr>
+</p:sld>
+</file>
+
+<file path=ppt/slides/slide23.xml><?xml version="1.0" encoding="utf-8"?>
+<p:sld xmlns:a="http://schemas.openxmlformats.org/drawingml/2006/main" xmlns:r="http://schemas.openxmlformats.org/officeDocument/2006/relationships" xmlns:p="http://schemas.openxmlformats.org/presentationml/2006/main">
+  <p:cSld>
+    <p:spTree>
+      <p:nvGrpSpPr>
+        <p:cNvPr id="1" name=""/>
+        <p:cNvGrpSpPr/>
+        <p:nvPr/>
+      </p:nvGrpSpPr>
+      <p:grpSpPr>
+        <a:xfrm>
+          <a:off x="0" y="0"/>
+          <a:ext cx="0" cy="0"/>
+          <a:chOff x="0" y="0"/>
+          <a:chExt cx="0" cy="0"/>
+        </a:xfrm>
+      </p:grpSpPr>
+      <p:sp>
+        <p:nvSpPr>
+          <p:cNvPr id="2" name="Title 1"/>
+          <p:cNvSpPr>
+            <a:spLocks noGrp="1"/>
+          </p:cNvSpPr>
+          <p:nvPr>
+            <p:ph type="title"/>
+          </p:nvPr>
+        </p:nvSpPr>
+        <p:spPr/>
+        <p:txBody>
+          <a:bodyPr/>
+          <a:lstStyle/>
+          <a:p>
+            <a:r>
+              <a:rPr lang="en-US" dirty="0" smtClean="0"/>
+              <a:t>Addison’s Disease</a:t>
+            </a:r>
+            <a:endParaRPr lang="en-US" dirty="0"/>
+          </a:p>
+        </p:txBody>
+      </p:sp>
+      <p:sp>
+        <p:nvSpPr>
+          <p:cNvPr id="3" name="Content Placeholder 2"/>
+          <p:cNvSpPr>
+            <a:spLocks noGrp="1"/>
+          </p:cNvSpPr>
+          <p:nvPr>
+            <p:ph idx="1"/>
+          </p:nvPr>
+        </p:nvSpPr>
+        <p:spPr>
+          <a:xfrm>
+            <a:off x="457200" y="1600200"/>
+            <a:ext cx="3975100" cy="4525963"/>
+          </a:xfrm>
+        </p:spPr>
+        <p:txBody>
+          <a:bodyPr>
+            <a:normAutofit fontScale="92500" lnSpcReduction="10000"/>
+          </a:bodyPr>
+          <a:lstStyle/>
+          <a:p>
+            <a:r>
+              <a:rPr lang="en-US" dirty="0" smtClean="0"/>
+              <a:t>Autoimmune destruction of adrenal gland</a:t>
+            </a:r>
+          </a:p>
+          <a:p>
+            <a:r>
+              <a:rPr lang="en-US" dirty="0" smtClean="0"/>
+              <a:t>How would this anatomically differ from CAH?</a:t>
+            </a:r>
+          </a:p>
+          <a:p>
+            <a:r>
+              <a:rPr lang="en-US" dirty="0" smtClean="0"/>
+              <a:t>Why would blood pressure be low?</a:t>
+            </a:r>
+          </a:p>
+          <a:p>
+            <a:r>
+              <a:rPr lang="en-US" dirty="0" smtClean="0"/>
+              <a:t>Why would there be a risk of hypoglycemia?</a:t>
+            </a:r>
+          </a:p>
+          <a:p>
+            <a:endParaRPr lang="en-US" dirty="0"/>
+          </a:p>
+        </p:txBody>
+      </p:sp>
+      <p:pic>
+        <p:nvPicPr>
+          <p:cNvPr id="4" name="Picture 3"/>
+          <p:cNvPicPr>
+            <a:picLocks noChangeAspect="1"/>
+          </p:cNvPicPr>
+          <p:nvPr/>
+        </p:nvPicPr>
+        <p:blipFill>
+          <a:blip r:embed="rId3"/>
+          <a:stretch>
+            <a:fillRect/>
+          </a:stretch>
+        </p:blipFill>
+        <p:spPr>
+          <a:xfrm>
+            <a:off x="4718705" y="1943100"/>
+            <a:ext cx="4425295" cy="3314700"/>
+          </a:xfrm>
+          <a:prstGeom prst="rect">
+            <a:avLst/>
+          </a:prstGeom>
+        </p:spPr>
+      </p:pic>
+    </p:spTree>
+    <p:extLst>
+      <p:ext uri="{BB962C8B-B14F-4D97-AF65-F5344CB8AC3E}">
+        <p14:creationId xmlns:p14="http://schemas.microsoft.com/office/powerpoint/2010/main" val="1847949821"/>
+      </p:ext>
+    </p:extLst>
+  </p:cSld>
+  <p:clrMapOvr>
+    <a:masterClrMapping/>
+  </p:clrMapOvr>
+</p:sld>
+</file>
+
+<file path=ppt/slides/slide24.xml><?xml version="1.0" encoding="utf-8"?>
+<p:sld xmlns:a="http://schemas.openxmlformats.org/drawingml/2006/main" xmlns:r="http://schemas.openxmlformats.org/officeDocument/2006/relationships" xmlns:p="http://schemas.openxmlformats.org/presentationml/2006/main">
+  <p:cSld>
+    <p:spTree>
+      <p:nvGrpSpPr>
+        <p:cNvPr id="1" name=""/>
+        <p:cNvGrpSpPr/>
+        <p:nvPr/>
+      </p:nvGrpSpPr>
+      <p:grpSpPr>
+        <a:xfrm>
+          <a:off x="0" y="0"/>
+          <a:ext cx="0" cy="0"/>
+          <a:chOff x="0" y="0"/>
+          <a:chExt cx="0" cy="0"/>
+        </a:xfrm>
+      </p:grpSpPr>
+      <p:sp>
+        <p:nvSpPr>
+          <p:cNvPr id="2" name="Title 1"/>
+          <p:cNvSpPr>
+            <a:spLocks noGrp="1"/>
+          </p:cNvSpPr>
+          <p:nvPr>
+            <p:ph type="title"/>
+          </p:nvPr>
+        </p:nvSpPr>
+        <p:spPr/>
+        <p:txBody>
+          <a:bodyPr/>
+          <a:lstStyle/>
+          <a:p>
+            <a:r>
+              <a:rPr lang="en-US" dirty="0" smtClean="0"/>
+              <a:t>Tumors Affecting Adrenal Function</a:t>
+            </a:r>
+            <a:endParaRPr lang="en-US" dirty="0"/>
+          </a:p>
+        </p:txBody>
+      </p:sp>
+      <p:sp>
+        <p:nvSpPr>
+          <p:cNvPr id="3" name="Content Placeholder 2"/>
+          <p:cNvSpPr>
+            <a:spLocks noGrp="1"/>
+          </p:cNvSpPr>
+          <p:nvPr>
+            <p:ph idx="1"/>
+          </p:nvPr>
+        </p:nvSpPr>
+        <p:spPr/>
+        <p:txBody>
+          <a:bodyPr/>
+          <a:lstStyle/>
+          <a:p>
+            <a:r>
+              <a:rPr lang="en-US" dirty="0" smtClean="0"/>
+              <a:t>Conn’s syndrome (adenoma of </a:t>
+            </a:r>
+            <a:r>
+              <a:rPr lang="en-US" dirty="0" err="1" smtClean="0"/>
+              <a:t>zona</a:t>
+            </a:r>
+            <a:r>
+              <a:rPr lang="en-US" dirty="0" smtClean="0"/>
+              <a:t> </a:t>
+            </a:r>
+            <a:r>
+              <a:rPr lang="en-US" dirty="0" err="1" smtClean="0"/>
+              <a:t>glomerulosa</a:t>
+            </a:r>
+            <a:r>
+              <a:rPr lang="en-US" dirty="0" smtClean="0"/>
+              <a:t>)</a:t>
+            </a:r>
+          </a:p>
+          <a:p>
+            <a:r>
+              <a:rPr lang="en-US" dirty="0" smtClean="0"/>
+              <a:t>Cushing’s syndrome</a:t>
+            </a:r>
+          </a:p>
+          <a:p>
+            <a:pPr lvl="1"/>
+            <a:r>
+              <a:rPr lang="en-US" dirty="0" smtClean="0"/>
+              <a:t>pituitary adenoma (ACTH releasing) or </a:t>
+            </a:r>
+          </a:p>
+          <a:p>
+            <a:pPr lvl="1"/>
+            <a:r>
+              <a:rPr lang="en-US" dirty="0" smtClean="0"/>
+              <a:t>adenoma of </a:t>
+            </a:r>
+            <a:r>
+              <a:rPr lang="en-US" dirty="0" err="1" smtClean="0"/>
+              <a:t>zona</a:t>
+            </a:r>
+            <a:r>
+              <a:rPr lang="en-US" dirty="0" smtClean="0"/>
+              <a:t> </a:t>
+            </a:r>
+            <a:r>
+              <a:rPr lang="en-US" dirty="0" err="1" smtClean="0"/>
+              <a:t>fasciculata</a:t>
+            </a:r>
+            <a:endParaRPr lang="en-US" dirty="0"/>
+          </a:p>
+        </p:txBody>
+      </p:sp>
+    </p:spTree>
+    <p:extLst>
+      <p:ext uri="{BB962C8B-B14F-4D97-AF65-F5344CB8AC3E}">
+        <p14:creationId xmlns:p14="http://schemas.microsoft.com/office/powerpoint/2010/main" val="1953080566"/>
+      </p:ext>
+    </p:extLst>
+  </p:cSld>
+  <p:clrMapOvr>
+    <a:masterClrMapping/>
+  </p:clrMapOvr>
+</p:sld>
+</file>
+
+<file path=ppt/slides/slide25.xml><?xml version="1.0" encoding="utf-8"?>
+<p:sld xmlns:a="http://schemas.openxmlformats.org/drawingml/2006/main" xmlns:r="http://schemas.openxmlformats.org/officeDocument/2006/relationships" xmlns:p="http://schemas.openxmlformats.org/presentationml/2006/main">
+  <p:cSld>
+    <p:spTree>
+      <p:nvGrpSpPr>
+        <p:cNvPr id="1" name=""/>
+        <p:cNvGrpSpPr/>
+        <p:nvPr/>
+      </p:nvGrpSpPr>
+      <p:grpSpPr>
+        <a:xfrm>
+          <a:off x="0" y="0"/>
+          <a:ext cx="0" cy="0"/>
+          <a:chOff x="0" y="0"/>
+          <a:chExt cx="0" cy="0"/>
+        </a:xfrm>
+      </p:grpSpPr>
+      <p:sp>
+        <p:nvSpPr>
+          <p:cNvPr id="4" name="Title 3"/>
+          <p:cNvSpPr>
+            <a:spLocks noGrp="1"/>
+          </p:cNvSpPr>
+          <p:nvPr>
+            <p:ph type="title"/>
+          </p:nvPr>
+        </p:nvSpPr>
+        <p:spPr/>
+        <p:txBody>
+          <a:bodyPr/>
+          <a:lstStyle/>
+          <a:p>
+            <a:r>
+              <a:rPr lang="en-US" dirty="0" smtClean="0"/>
+              <a:t>Adrenaline Mediates Short-Term Stress Responses</a:t>
+            </a:r>
+            <a:endParaRPr lang="en-US" dirty="0"/>
+          </a:p>
+        </p:txBody>
+      </p:sp>
+      <p:sp>
+        <p:nvSpPr>
+          <p:cNvPr id="5" name="Text Placeholder 4"/>
+          <p:cNvSpPr>
+            <a:spLocks noGrp="1"/>
+          </p:cNvSpPr>
+          <p:nvPr>
+            <p:ph type="body" idx="1"/>
+          </p:nvPr>
+        </p:nvSpPr>
+        <p:spPr/>
+        <p:txBody>
+          <a:bodyPr/>
+          <a:lstStyle/>
+          <a:p>
+            <a:endParaRPr lang="en-US"/>
+          </a:p>
+        </p:txBody>
+      </p:sp>
+    </p:spTree>
+    <p:extLst>
+      <p:ext uri="{BB962C8B-B14F-4D97-AF65-F5344CB8AC3E}">
+        <p14:creationId xmlns:p14="http://schemas.microsoft.com/office/powerpoint/2010/main" val="3134858806"/>
       </p:ext>
     </p:extLst>
   </p:cSld>
@@ -6008,4 +7494,324 @@
   </a:objectDefaults>
   <a:extraClrSchemeLst/>
 </a:theme>
+</file>
+
+<file path=ppt/theme/theme2.xml><?xml version="1.0" encoding="utf-8"?>
+<a:theme xmlns:a="http://schemas.openxmlformats.org/drawingml/2006/main" name="Office Theme">
+  <a:themeElements>
+    <a:clrScheme name="Office">
+      <a:dk1>
+        <a:sysClr val="windowText" lastClr="000000"/>
+      </a:dk1>
+      <a:lt1>
+        <a:sysClr val="window" lastClr="FFFFFF"/>
+      </a:lt1>
+      <a:dk2>
+        <a:srgbClr val="1F497D"/>
+      </a:dk2>
+      <a:lt2>
+        <a:srgbClr val="EEECE1"/>
+      </a:lt2>
+      <a:accent1>
+        <a:srgbClr val="4F81BD"/>
+      </a:accent1>
+      <a:accent2>
+        <a:srgbClr val="C0504D"/>
+      </a:accent2>
+      <a:accent3>
+        <a:srgbClr val="9BBB59"/>
+      </a:accent3>
+      <a:accent4>
+        <a:srgbClr val="8064A2"/>
+      </a:accent4>
+      <a:accent5>
+        <a:srgbClr val="4BACC6"/>
+      </a:accent5>
+      <a:accent6>
+        <a:srgbClr val="F79646"/>
+      </a:accent6>
+      <a:hlink>
+        <a:srgbClr val="0000FF"/>
+      </a:hlink>
+      <a:folHlink>
+        <a:srgbClr val="800080"/>
+      </a:folHlink>
+    </a:clrScheme>
+    <a:fontScheme name="Office">
+      <a:majorFont>
+        <a:latin typeface="Calibri"/>
+        <a:ea typeface=""/>
+        <a:cs typeface=""/>
+        <a:font script="Jpan" typeface="ＭＳ Ｐゴシック"/>
+        <a:font script="Hang" typeface="맑은 고딕"/>
+        <a:font script="Hans" typeface="宋体"/>
+        <a:font script="Hant" typeface="新細明體"/>
+        <a:font script="Arab" typeface="Times New Roman"/>
+        <a:font script="Hebr" typeface="Times New Roman"/>
+        <a:font script="Thai" typeface="Angsana New"/>
+        <a:font script="Ethi" typeface="Nyala"/>
+        <a:font script="Beng" typeface="Vrinda"/>
+        <a:font script="Gujr" typeface="Shruti"/>
+        <a:font script="Khmr" typeface="MoolBoran"/>
+        <a:font script="Knda" typeface="Tunga"/>
+        <a:font script="Guru" typeface="Raavi"/>
+        <a:font script="Cans" typeface="Euphemia"/>
+        <a:font script="Cher" typeface="Plantagenet Cherokee"/>
+        <a:font script="Yiii" typeface="Microsoft Yi Baiti"/>
+        <a:font script="Tibt" typeface="Microsoft Himalaya"/>
+        <a:font script="Thaa" typeface="MV Boli"/>
+        <a:font script="Deva" typeface="Mangal"/>
+        <a:font script="Telu" typeface="Gautami"/>
+        <a:font script="Taml" typeface="Latha"/>
+        <a:font script="Syrc" typeface="Estrangelo Edessa"/>
+        <a:font script="Orya" typeface="Kalinga"/>
+        <a:font script="Mlym" typeface="Kartika"/>
+        <a:font script="Laoo" typeface="DokChampa"/>
+        <a:font script="Sinh" typeface="Iskoola Pota"/>
+        <a:font script="Mong" typeface="Mongolian Baiti"/>
+        <a:font script="Viet" typeface="Times New Roman"/>
+        <a:font script="Uigh" typeface="Microsoft Uighur"/>
+        <a:font script="Geor" typeface="Sylfaen"/>
+      </a:majorFont>
+      <a:minorFont>
+        <a:latin typeface="Calibri"/>
+        <a:ea typeface=""/>
+        <a:cs typeface=""/>
+        <a:font script="Jpan" typeface="ＭＳ Ｐゴシック"/>
+        <a:font script="Hang" typeface="맑은 고딕"/>
+        <a:font script="Hans" typeface="宋体"/>
+        <a:font script="Hant" typeface="新細明體"/>
+        <a:font script="Arab" typeface="Arial"/>
+        <a:font script="Hebr" typeface="Arial"/>
+        <a:font script="Thai" typeface="Cordia New"/>
+        <a:font script="Ethi" typeface="Nyala"/>
+        <a:font script="Beng" typeface="Vrinda"/>
+        <a:font script="Gujr" typeface="Shruti"/>
+        <a:font script="Khmr" typeface="DaunPenh"/>
+        <a:font script="Knda" typeface="Tunga"/>
+        <a:font script="Guru" typeface="Raavi"/>
+        <a:font script="Cans" typeface="Euphemia"/>
+        <a:font script="Cher" typeface="Plantagenet Cherokee"/>
+        <a:font script="Yiii" typeface="Microsoft Yi Baiti"/>
+        <a:font script="Tibt" typeface="Microsoft Himalaya"/>
+        <a:font script="Thaa" typeface="MV Boli"/>
+        <a:font script="Deva" typeface="Mangal"/>
+        <a:font script="Telu" typeface="Gautami"/>
+        <a:font script="Taml" typeface="Latha"/>
+        <a:font script="Syrc" typeface="Estrangelo Edessa"/>
+        <a:font script="Orya" typeface="Kalinga"/>
+        <a:font script="Mlym" typeface="Kartika"/>
+        <a:font script="Laoo" typeface="DokChampa"/>
+        <a:font script="Sinh" typeface="Iskoola Pota"/>
+        <a:font script="Mong" typeface="Mongolian Baiti"/>
+        <a:font script="Viet" typeface="Arial"/>
+        <a:font script="Uigh" typeface="Microsoft Uighur"/>
+        <a:font script="Geor" typeface="Sylfaen"/>
+      </a:minorFont>
+    </a:fontScheme>
+    <a:fmtScheme name="Office">
+      <a:fillStyleLst>
+        <a:solidFill>
+          <a:schemeClr val="phClr"/>
+        </a:solidFill>
+        <a:gradFill rotWithShape="1">
+          <a:gsLst>
+            <a:gs pos="0">
+              <a:schemeClr val="phClr">
+                <a:tint val="50000"/>
+                <a:satMod val="300000"/>
+              </a:schemeClr>
+            </a:gs>
+            <a:gs pos="35000">
+              <a:schemeClr val="phClr">
+                <a:tint val="37000"/>
+                <a:satMod val="300000"/>
+              </a:schemeClr>
+            </a:gs>
+            <a:gs pos="100000">
+              <a:schemeClr val="phClr">
+                <a:tint val="15000"/>
+                <a:satMod val="350000"/>
+              </a:schemeClr>
+            </a:gs>
+          </a:gsLst>
+          <a:lin ang="16200000" scaled="1"/>
+        </a:gradFill>
+        <a:gradFill rotWithShape="1">
+          <a:gsLst>
+            <a:gs pos="0">
+              <a:schemeClr val="phClr">
+                <a:tint val="100000"/>
+                <a:shade val="100000"/>
+                <a:satMod val="130000"/>
+              </a:schemeClr>
+            </a:gs>
+            <a:gs pos="100000">
+              <a:schemeClr val="phClr">
+                <a:tint val="50000"/>
+                <a:shade val="100000"/>
+                <a:satMod val="350000"/>
+              </a:schemeClr>
+            </a:gs>
+          </a:gsLst>
+          <a:lin ang="16200000" scaled="0"/>
+        </a:gradFill>
+      </a:fillStyleLst>
+      <a:lnStyleLst>
+        <a:ln w="9525" cap="flat" cmpd="sng" algn="ctr">
+          <a:solidFill>
+            <a:schemeClr val="phClr">
+              <a:shade val="95000"/>
+              <a:satMod val="105000"/>
+            </a:schemeClr>
+          </a:solidFill>
+          <a:prstDash val="solid"/>
+        </a:ln>
+        <a:ln w="25400" cap="flat" cmpd="sng" algn="ctr">
+          <a:solidFill>
+            <a:schemeClr val="phClr"/>
+          </a:solidFill>
+          <a:prstDash val="solid"/>
+        </a:ln>
+        <a:ln w="38100" cap="flat" cmpd="sng" algn="ctr">
+          <a:solidFill>
+            <a:schemeClr val="phClr"/>
+          </a:solidFill>
+          <a:prstDash val="solid"/>
+        </a:ln>
+      </a:lnStyleLst>
+      <a:effectStyleLst>
+        <a:effectStyle>
+          <a:effectLst>
+            <a:outerShdw blurRad="40000" dist="20000" dir="5400000" rotWithShape="0">
+              <a:srgbClr val="000000">
+                <a:alpha val="38000"/>
+              </a:srgbClr>
+            </a:outerShdw>
+          </a:effectLst>
+        </a:effectStyle>
+        <a:effectStyle>
+          <a:effectLst>
+            <a:outerShdw blurRad="40000" dist="23000" dir="5400000" rotWithShape="0">
+              <a:srgbClr val="000000">
+                <a:alpha val="35000"/>
+              </a:srgbClr>
+            </a:outerShdw>
+          </a:effectLst>
+        </a:effectStyle>
+        <a:effectStyle>
+          <a:effectLst>
+            <a:outerShdw blurRad="40000" dist="23000" dir="5400000" rotWithShape="0">
+              <a:srgbClr val="000000">
+                <a:alpha val="35000"/>
+              </a:srgbClr>
+            </a:outerShdw>
+          </a:effectLst>
+          <a:scene3d>
+            <a:camera prst="orthographicFront">
+              <a:rot lat="0" lon="0" rev="0"/>
+            </a:camera>
+            <a:lightRig rig="threePt" dir="t">
+              <a:rot lat="0" lon="0" rev="1200000"/>
+            </a:lightRig>
+          </a:scene3d>
+          <a:sp3d>
+            <a:bevelT w="63500" h="25400"/>
+          </a:sp3d>
+        </a:effectStyle>
+      </a:effectStyleLst>
+      <a:bgFillStyleLst>
+        <a:solidFill>
+          <a:schemeClr val="phClr"/>
+        </a:solidFill>
+        <a:gradFill rotWithShape="1">
+          <a:gsLst>
+            <a:gs pos="0">
+              <a:schemeClr val="phClr">
+                <a:tint val="40000"/>
+                <a:satMod val="350000"/>
+              </a:schemeClr>
+            </a:gs>
+            <a:gs pos="40000">
+              <a:schemeClr val="phClr">
+                <a:tint val="45000"/>
+                <a:shade val="99000"/>
+                <a:satMod val="350000"/>
+              </a:schemeClr>
+            </a:gs>
+            <a:gs pos="100000">
+              <a:schemeClr val="phClr">
+                <a:shade val="20000"/>
+                <a:satMod val="255000"/>
+              </a:schemeClr>
+            </a:gs>
+          </a:gsLst>
+          <a:path path="circle">
+            <a:fillToRect l="50000" t="-80000" r="50000" b="180000"/>
+          </a:path>
+        </a:gradFill>
+        <a:gradFill rotWithShape="1">
+          <a:gsLst>
+            <a:gs pos="0">
+              <a:schemeClr val="phClr">
+                <a:tint val="80000"/>
+                <a:satMod val="300000"/>
+              </a:schemeClr>
+            </a:gs>
+            <a:gs pos="100000">
+              <a:schemeClr val="phClr">
+                <a:shade val="30000"/>
+                <a:satMod val="200000"/>
+              </a:schemeClr>
+            </a:gs>
+          </a:gsLst>
+          <a:path path="circle">
+            <a:fillToRect l="50000" t="50000" r="50000" b="50000"/>
+          </a:path>
+        </a:gradFill>
+      </a:bgFillStyleLst>
+    </a:fmtScheme>
+  </a:themeElements>
+  <a:objectDefaults>
+    <a:spDef>
+      <a:spPr/>
+      <a:bodyPr/>
+      <a:lstStyle/>
+      <a:style>
+        <a:lnRef idx="1">
+          <a:schemeClr val="accent1"/>
+        </a:lnRef>
+        <a:fillRef idx="3">
+          <a:schemeClr val="accent1"/>
+        </a:fillRef>
+        <a:effectRef idx="2">
+          <a:schemeClr val="accent1"/>
+        </a:effectRef>
+        <a:fontRef idx="minor">
+          <a:schemeClr val="lt1"/>
+        </a:fontRef>
+      </a:style>
+    </a:spDef>
+    <a:lnDef>
+      <a:spPr/>
+      <a:bodyPr/>
+      <a:lstStyle/>
+      <a:style>
+        <a:lnRef idx="2">
+          <a:schemeClr val="accent1"/>
+        </a:lnRef>
+        <a:fillRef idx="0">
+          <a:schemeClr val="accent1"/>
+        </a:fillRef>
+        <a:effectRef idx="1">
+          <a:schemeClr val="accent1"/>
+        </a:effectRef>
+        <a:fontRef idx="minor">
+          <a:schemeClr val="tx1"/>
+        </a:fontRef>
+      </a:style>
+    </a:lnDef>
+  </a:objectDefaults>
+  <a:extraClrSchemeLst/>
+</a:theme>
 </file>
</xml_diff>